<commit_message>
Commit projet 4 validé 080223
</commit_message>
<xml_diff>
--- a/Projet 4/Livrables/presentation_projet_4_2.pptx
+++ b/Projet 4/Livrables/presentation_projet_4_2.pptx
@@ -203,7 +203,7 @@
           <a:p>
             <a:fld id="{D2830747-5AB3-43B2-93B8-72A8C452CA06}" type="datetimeFigureOut">
               <a:rPr lang="fr-FR" smtClean="0"/>
-              <a:t>27/01/2023</a:t>
+              <a:t>07/02/2023</a:t>
             </a:fld>
             <a:endParaRPr lang="fr-FR"/>
           </a:p>
@@ -563,6 +563,110 @@
 </p:notes>
 </file>
 
+<file path=ppt/notesSlides/notesSlide2.xml><?xml version="1.0" encoding="utf-8"?>
+<p:notes xmlns:a="http://schemas.openxmlformats.org/drawingml/2006/main" xmlns:r="http://schemas.openxmlformats.org/officeDocument/2006/relationships" xmlns:p="http://schemas.openxmlformats.org/presentationml/2006/main">
+  <p:cSld>
+    <p:spTree>
+      <p:nvGrpSpPr>
+        <p:cNvPr id="1" name=""/>
+        <p:cNvGrpSpPr/>
+        <p:nvPr/>
+      </p:nvGrpSpPr>
+      <p:grpSpPr>
+        <a:xfrm>
+          <a:off x="0" y="0"/>
+          <a:ext cx="0" cy="0"/>
+          <a:chOff x="0" y="0"/>
+          <a:chExt cx="0" cy="0"/>
+        </a:xfrm>
+      </p:grpSpPr>
+      <p:sp>
+        <p:nvSpPr>
+          <p:cNvPr id="2" name="Espace réservé de l'image des diapositives 1"/>
+          <p:cNvSpPr>
+            <a:spLocks noGrp="1" noRot="1" noChangeAspect="1"/>
+          </p:cNvSpPr>
+          <p:nvPr>
+            <p:ph type="sldImg"/>
+          </p:nvPr>
+        </p:nvSpPr>
+        <p:spPr/>
+      </p:sp>
+      <p:sp>
+        <p:nvSpPr>
+          <p:cNvPr id="3" name="Espace réservé des notes 2"/>
+          <p:cNvSpPr>
+            <a:spLocks noGrp="1"/>
+          </p:cNvSpPr>
+          <p:nvPr>
+            <p:ph type="body" idx="1"/>
+          </p:nvPr>
+        </p:nvSpPr>
+        <p:spPr/>
+        <p:txBody>
+          <a:bodyPr/>
+          <a:lstStyle/>
+          <a:p>
+            <a:r>
+              <a:rPr lang="fr-FR" dirty="0"/>
+              <a:t>Par de corrélation visible, on ne peut pas dire que la quantité d'aides alimentaires dépend de la proportion de personnes en sous nutrition. </a:t>
+            </a:r>
+          </a:p>
+          <a:p>
+            <a:r>
+              <a:rPr lang="fr-FR" dirty="0"/>
+              <a:t>Comme précédemment, on peut dire que d'autres facteurs rentrent en compte.</a:t>
+            </a:r>
+          </a:p>
+          <a:p>
+            <a:r>
+              <a:rPr lang="fr-FR" dirty="0"/>
+              <a:t>Il faudrait approfondir l’étude pour </a:t>
+            </a:r>
+            <a:r>
+              <a:rPr lang="fr-FR"/>
+              <a:t>les connaitre.</a:t>
+            </a:r>
+            <a:endParaRPr lang="fr-FR" dirty="0"/>
+          </a:p>
+        </p:txBody>
+      </p:sp>
+      <p:sp>
+        <p:nvSpPr>
+          <p:cNvPr id="4" name="Espace réservé du numéro de diapositive 3"/>
+          <p:cNvSpPr>
+            <a:spLocks noGrp="1"/>
+          </p:cNvSpPr>
+          <p:nvPr>
+            <p:ph type="sldNum" sz="quarter" idx="5"/>
+          </p:nvPr>
+        </p:nvSpPr>
+        <p:spPr/>
+        <p:txBody>
+          <a:bodyPr/>
+          <a:lstStyle/>
+          <a:p>
+            <a:fld id="{A91275F9-21B7-4797-937C-56D3254559ED}" type="slidenum">
+              <a:rPr lang="fr-FR" smtClean="0"/>
+              <a:t>6</a:t>
+            </a:fld>
+            <a:endParaRPr lang="fr-FR"/>
+          </a:p>
+        </p:txBody>
+      </p:sp>
+    </p:spTree>
+    <p:extLst>
+      <p:ext uri="{BB962C8B-B14F-4D97-AF65-F5344CB8AC3E}">
+        <p14:creationId xmlns:p14="http://schemas.microsoft.com/office/powerpoint/2010/main" val="1676473245"/>
+      </p:ext>
+    </p:extLst>
+  </p:cSld>
+  <p:clrMapOvr>
+    <a:masterClrMapping/>
+  </p:clrMapOvr>
+</p:notes>
+</file>
+
 <file path=ppt/slideLayouts/slideLayout1.xml><?xml version="1.0" encoding="utf-8"?>
 <p:sldLayout xmlns:a="http://schemas.openxmlformats.org/drawingml/2006/main" xmlns:r="http://schemas.openxmlformats.org/officeDocument/2006/relationships" xmlns:p="http://schemas.openxmlformats.org/presentationml/2006/main" type="title" preserve="1">
   <p:cSld name="Diapositive de titre">
@@ -710,7 +814,7 @@
           <a:p>
             <a:fld id="{8BFD83F0-6321-4473-9B4F-8739DE001863}" type="datetimeFigureOut">
               <a:rPr lang="fr-FR" smtClean="0"/>
-              <a:t>27/01/2023</a:t>
+              <a:t>07/02/2023</a:t>
             </a:fld>
             <a:endParaRPr lang="fr-FR"/>
           </a:p>
@@ -908,7 +1012,7 @@
           <a:p>
             <a:fld id="{8BFD83F0-6321-4473-9B4F-8739DE001863}" type="datetimeFigureOut">
               <a:rPr lang="fr-FR" smtClean="0"/>
-              <a:t>27/01/2023</a:t>
+              <a:t>07/02/2023</a:t>
             </a:fld>
             <a:endParaRPr lang="fr-FR"/>
           </a:p>
@@ -1116,7 +1220,7 @@
           <a:p>
             <a:fld id="{8BFD83F0-6321-4473-9B4F-8739DE001863}" type="datetimeFigureOut">
               <a:rPr lang="fr-FR" smtClean="0"/>
-              <a:t>27/01/2023</a:t>
+              <a:t>07/02/2023</a:t>
             </a:fld>
             <a:endParaRPr lang="fr-FR"/>
           </a:p>
@@ -1314,7 +1418,7 @@
           <a:p>
             <a:fld id="{8BFD83F0-6321-4473-9B4F-8739DE001863}" type="datetimeFigureOut">
               <a:rPr lang="fr-FR" smtClean="0"/>
-              <a:t>27/01/2023</a:t>
+              <a:t>07/02/2023</a:t>
             </a:fld>
             <a:endParaRPr lang="fr-FR"/>
           </a:p>
@@ -1589,7 +1693,7 @@
           <a:p>
             <a:fld id="{8BFD83F0-6321-4473-9B4F-8739DE001863}" type="datetimeFigureOut">
               <a:rPr lang="fr-FR" smtClean="0"/>
-              <a:t>27/01/2023</a:t>
+              <a:t>07/02/2023</a:t>
             </a:fld>
             <a:endParaRPr lang="fr-FR"/>
           </a:p>
@@ -1854,7 +1958,7 @@
           <a:p>
             <a:fld id="{8BFD83F0-6321-4473-9B4F-8739DE001863}" type="datetimeFigureOut">
               <a:rPr lang="fr-FR" smtClean="0"/>
-              <a:t>27/01/2023</a:t>
+              <a:t>07/02/2023</a:t>
             </a:fld>
             <a:endParaRPr lang="fr-FR"/>
           </a:p>
@@ -2266,7 +2370,7 @@
           <a:p>
             <a:fld id="{8BFD83F0-6321-4473-9B4F-8739DE001863}" type="datetimeFigureOut">
               <a:rPr lang="fr-FR" smtClean="0"/>
-              <a:t>27/01/2023</a:t>
+              <a:t>07/02/2023</a:t>
             </a:fld>
             <a:endParaRPr lang="fr-FR"/>
           </a:p>
@@ -2407,7 +2511,7 @@
           <a:p>
             <a:fld id="{8BFD83F0-6321-4473-9B4F-8739DE001863}" type="datetimeFigureOut">
               <a:rPr lang="fr-FR" smtClean="0"/>
-              <a:t>27/01/2023</a:t>
+              <a:t>07/02/2023</a:t>
             </a:fld>
             <a:endParaRPr lang="fr-FR"/>
           </a:p>
@@ -2520,7 +2624,7 @@
           <a:p>
             <a:fld id="{8BFD83F0-6321-4473-9B4F-8739DE001863}" type="datetimeFigureOut">
               <a:rPr lang="fr-FR" smtClean="0"/>
-              <a:t>27/01/2023</a:t>
+              <a:t>07/02/2023</a:t>
             </a:fld>
             <a:endParaRPr lang="fr-FR"/>
           </a:p>
@@ -2831,7 +2935,7 @@
           <a:p>
             <a:fld id="{8BFD83F0-6321-4473-9B4F-8739DE001863}" type="datetimeFigureOut">
               <a:rPr lang="fr-FR" smtClean="0"/>
-              <a:t>27/01/2023</a:t>
+              <a:t>07/02/2023</a:t>
             </a:fld>
             <a:endParaRPr lang="fr-FR"/>
           </a:p>
@@ -3119,7 +3223,7 @@
           <a:p>
             <a:fld id="{8BFD83F0-6321-4473-9B4F-8739DE001863}" type="datetimeFigureOut">
               <a:rPr lang="fr-FR" smtClean="0"/>
-              <a:t>27/01/2023</a:t>
+              <a:t>07/02/2023</a:t>
             </a:fld>
             <a:endParaRPr lang="fr-FR"/>
           </a:p>
@@ -3360,7 +3464,7 @@
           <a:p>
             <a:fld id="{8BFD83F0-6321-4473-9B4F-8739DE001863}" type="datetimeFigureOut">
               <a:rPr lang="fr-FR" smtClean="0"/>
-              <a:t>27/01/2023</a:t>
+              <a:t>07/02/2023</a:t>
             </a:fld>
             <a:endParaRPr lang="fr-FR"/>
           </a:p>
@@ -3967,7 +4071,7 @@
             <a:pPr lvl="1"/>
             <a:r>
               <a:rPr lang="en-US" i="1" dirty="0"/>
-              <a:t> Branche de </a:t>
+              <a:t>Branche de </a:t>
             </a:r>
             <a:r>
               <a:rPr lang="en-US" i="1" dirty="0" err="1"/>
@@ -4157,13 +4261,13 @@
         </p:nvSpPr>
         <p:spPr>
           <a:xfrm>
-            <a:off x="838200" y="2205038"/>
-            <a:ext cx="10515600" cy="2816142"/>
+            <a:off x="838200" y="1947863"/>
+            <a:ext cx="10515600" cy="3577381"/>
           </a:xfrm>
         </p:spPr>
         <p:txBody>
           <a:bodyPr>
-            <a:normAutofit fontScale="92500" lnSpcReduction="10000"/>
+            <a:normAutofit/>
           </a:bodyPr>
           <a:lstStyle/>
           <a:p>
@@ -4180,9 +4284,7 @@
             </a:r>
           </a:p>
           <a:p>
-            <a:endParaRPr lang="fr-FR" dirty="0"/>
-          </a:p>
-          <a:p>
+            <a:pPr lvl="1"/>
             <a:endParaRPr lang="fr-FR" dirty="0"/>
           </a:p>
           <a:p>
@@ -4200,6 +4302,9 @@
           </a:p>
           <a:p>
             <a:pPr lvl="1"/>
+            <a:endParaRPr lang="fr-FR" dirty="0"/>
+          </a:p>
+          <a:p>
             <a:r>
               <a:rPr lang="fr-FR" dirty="0"/>
               <a:t>Conclusion globale</a:t>
@@ -4533,21 +4638,24 @@
             <a:endParaRPr lang="fr-FR" dirty="0"/>
           </a:p>
           <a:p>
+            <a:endParaRPr lang="fr-FR" dirty="0"/>
+          </a:p>
+          <a:p>
             <a:r>
               <a:rPr lang="fr-FR" dirty="0"/>
               <a:t>Les hypothèses et approfondissement</a:t>
             </a:r>
           </a:p>
           <a:p>
+            <a:pPr marL="0" indent="0">
+              <a:buNone/>
+            </a:pPr>
             <a:endParaRPr lang="fr-FR" dirty="0"/>
           </a:p>
           <a:p>
-            <a:r>
-              <a:rPr lang="fr-FR" dirty="0"/>
-              <a:t>Les liens entre les variables</a:t>
-            </a:r>
-          </a:p>
-          <a:p>
+            <a:pPr marL="0" indent="0">
+              <a:buNone/>
+            </a:pPr>
             <a:endParaRPr lang="fr-FR" dirty="0"/>
           </a:p>
           <a:p>
@@ -4636,7 +4744,7 @@
         </p:nvSpPr>
         <p:spPr>
           <a:xfrm>
-            <a:off x="838200" y="365125"/>
+            <a:off x="838200" y="122868"/>
             <a:ext cx="10515600" cy="1221079"/>
           </a:xfrm>
         </p:spPr>
@@ -4669,42 +4777,47 @@
         </p:nvSpPr>
         <p:spPr>
           <a:xfrm>
-            <a:off x="922176" y="1808810"/>
+            <a:off x="838200" y="1191660"/>
             <a:ext cx="4918788" cy="4590759"/>
           </a:xfrm>
         </p:spPr>
         <p:txBody>
-          <a:bodyPr/>
-          <a:lstStyle/>
-          <a:p>
-            <a:r>
-              <a:rPr lang="fr-FR" dirty="0"/>
+          <a:bodyPr>
+            <a:normAutofit/>
+          </a:bodyPr>
+          <a:lstStyle/>
+          <a:p>
+            <a:r>
+              <a:rPr lang="fr-FR" sz="2400" dirty="0"/>
               <a:t>En 2017 :</a:t>
             </a:r>
           </a:p>
           <a:p>
             <a:pPr lvl="1"/>
             <a:r>
-              <a:rPr lang="fr-FR" dirty="0"/>
-              <a:t>5,36 millions de personnes sous alimentées d’après les données collectées</a:t>
+              <a:rPr lang="fr-FR" sz="2000" dirty="0"/>
+              <a:t>535 millions de personnes sous alimentées d’après les données collectées</a:t>
             </a:r>
           </a:p>
           <a:p>
             <a:pPr lvl="1"/>
             <a:r>
-              <a:rPr lang="fr-FR" dirty="0"/>
+              <a:rPr lang="fr-FR" sz="2000" dirty="0"/>
               <a:t>Plus de 9 milliards de personnes auraient pu être nourries </a:t>
             </a:r>
           </a:p>
           <a:p>
             <a:pPr lvl="1"/>
             <a:r>
-              <a:rPr lang="fr-FR" dirty="0"/>
+              <a:rPr lang="fr-FR" sz="2000" dirty="0"/>
               <a:t>Seulement 50% des aliments comestibles sont utilisées pour l’alimentation humaine</a:t>
             </a:r>
           </a:p>
           <a:p>
-            <a:endParaRPr lang="fr-FR" dirty="0"/>
+            <a:r>
+              <a:rPr lang="fr-FR" sz="2400" dirty="0"/>
+              <a:t>Plus de 11 millions de tonnes d’aides alimentaires distribuées entre 2013 et 2018</a:t>
+            </a:r>
           </a:p>
         </p:txBody>
       </p:sp>
@@ -4723,7 +4836,7 @@
           <p:nvPr/>
         </p:nvPicPr>
         <p:blipFill>
-          <a:blip r:embed="rId2"/>
+          <a:blip r:embed="rId3"/>
           <a:stretch>
             <a:fillRect/>
           </a:stretch>
@@ -4753,14 +4866,14 @@
           <p:nvPr/>
         </p:nvPicPr>
         <p:blipFill>
-          <a:blip r:embed="rId3"/>
+          <a:blip r:embed="rId4"/>
           <a:stretch>
             <a:fillRect/>
           </a:stretch>
         </p:blipFill>
         <p:spPr>
           <a:xfrm>
-            <a:off x="6197275" y="1384024"/>
+            <a:off x="6300107" y="1177179"/>
             <a:ext cx="5619750" cy="4600575"/>
           </a:xfrm>
           <a:prstGeom prst="rect">

</xml_diff>